<commit_message>
pass on section 4
</commit_message>
<xml_diff>
--- a/paper/figs/nids-workflow.pptx
+++ b/paper/figs/nids-workflow.pptx
@@ -288,7 +288,7 @@
           <a:p>
             <a:fld id="{3F9B73F4-B5EF-4BFE-8F68-05AE23C6DCB2}" type="datetimeFigureOut">
               <a:rPr lang="pt-BR" smtClean="0"/>
-              <a:t>06/01/2020</a:t>
+              <a:t>24/02/2020</a:t>
             </a:fld>
             <a:endParaRPr lang="pt-BR"/>
           </a:p>
@@ -458,7 +458,7 @@
           <a:p>
             <a:fld id="{3F9B73F4-B5EF-4BFE-8F68-05AE23C6DCB2}" type="datetimeFigureOut">
               <a:rPr lang="pt-BR" smtClean="0"/>
-              <a:t>06/01/2020</a:t>
+              <a:t>24/02/2020</a:t>
             </a:fld>
             <a:endParaRPr lang="pt-BR"/>
           </a:p>
@@ -638,7 +638,7 @@
           <a:p>
             <a:fld id="{3F9B73F4-B5EF-4BFE-8F68-05AE23C6DCB2}" type="datetimeFigureOut">
               <a:rPr lang="pt-BR" smtClean="0"/>
-              <a:t>06/01/2020</a:t>
+              <a:t>24/02/2020</a:t>
             </a:fld>
             <a:endParaRPr lang="pt-BR"/>
           </a:p>
@@ -808,7 +808,7 @@
           <a:p>
             <a:fld id="{3F9B73F4-B5EF-4BFE-8F68-05AE23C6DCB2}" type="datetimeFigureOut">
               <a:rPr lang="pt-BR" smtClean="0"/>
-              <a:t>06/01/2020</a:t>
+              <a:t>24/02/2020</a:t>
             </a:fld>
             <a:endParaRPr lang="pt-BR"/>
           </a:p>
@@ -1054,7 +1054,7 @@
           <a:p>
             <a:fld id="{3F9B73F4-B5EF-4BFE-8F68-05AE23C6DCB2}" type="datetimeFigureOut">
               <a:rPr lang="pt-BR" smtClean="0"/>
-              <a:t>06/01/2020</a:t>
+              <a:t>24/02/2020</a:t>
             </a:fld>
             <a:endParaRPr lang="pt-BR"/>
           </a:p>
@@ -1342,7 +1342,7 @@
           <a:p>
             <a:fld id="{3F9B73F4-B5EF-4BFE-8F68-05AE23C6DCB2}" type="datetimeFigureOut">
               <a:rPr lang="pt-BR" smtClean="0"/>
-              <a:t>06/01/2020</a:t>
+              <a:t>24/02/2020</a:t>
             </a:fld>
             <a:endParaRPr lang="pt-BR"/>
           </a:p>
@@ -1764,7 +1764,7 @@
           <a:p>
             <a:fld id="{3F9B73F4-B5EF-4BFE-8F68-05AE23C6DCB2}" type="datetimeFigureOut">
               <a:rPr lang="pt-BR" smtClean="0"/>
-              <a:t>06/01/2020</a:t>
+              <a:t>24/02/2020</a:t>
             </a:fld>
             <a:endParaRPr lang="pt-BR"/>
           </a:p>
@@ -1882,7 +1882,7 @@
           <a:p>
             <a:fld id="{3F9B73F4-B5EF-4BFE-8F68-05AE23C6DCB2}" type="datetimeFigureOut">
               <a:rPr lang="pt-BR" smtClean="0"/>
-              <a:t>06/01/2020</a:t>
+              <a:t>24/02/2020</a:t>
             </a:fld>
             <a:endParaRPr lang="pt-BR"/>
           </a:p>
@@ -1977,7 +1977,7 @@
           <a:p>
             <a:fld id="{3F9B73F4-B5EF-4BFE-8F68-05AE23C6DCB2}" type="datetimeFigureOut">
               <a:rPr lang="pt-BR" smtClean="0"/>
-              <a:t>06/01/2020</a:t>
+              <a:t>24/02/2020</a:t>
             </a:fld>
             <a:endParaRPr lang="pt-BR"/>
           </a:p>
@@ -2254,7 +2254,7 @@
           <a:p>
             <a:fld id="{3F9B73F4-B5EF-4BFE-8F68-05AE23C6DCB2}" type="datetimeFigureOut">
               <a:rPr lang="pt-BR" smtClean="0"/>
-              <a:t>06/01/2020</a:t>
+              <a:t>24/02/2020</a:t>
             </a:fld>
             <a:endParaRPr lang="pt-BR"/>
           </a:p>
@@ -2507,7 +2507,7 @@
           <a:p>
             <a:fld id="{3F9B73F4-B5EF-4BFE-8F68-05AE23C6DCB2}" type="datetimeFigureOut">
               <a:rPr lang="pt-BR" smtClean="0"/>
-              <a:t>06/01/2020</a:t>
+              <a:t>24/02/2020</a:t>
             </a:fld>
             <a:endParaRPr lang="pt-BR"/>
           </a:p>
@@ -2720,7 +2720,7 @@
           <a:p>
             <a:fld id="{3F9B73F4-B5EF-4BFE-8F68-05AE23C6DCB2}" type="datetimeFigureOut">
               <a:rPr lang="pt-BR" smtClean="0"/>
-              <a:t>06/01/2020</a:t>
+              <a:t>24/02/2020</a:t>
             </a:fld>
             <a:endParaRPr lang="pt-BR"/>
           </a:p>
@@ -3103,7 +3103,7 @@
         </p:nvSpPr>
         <p:spPr>
           <a:xfrm>
-            <a:off x="783475" y="1556792"/>
+            <a:off x="35496" y="404664"/>
             <a:ext cx="1082349" cy="646331"/>
           </a:xfrm>
           <a:prstGeom prst="rect">
@@ -3122,7 +3122,6 @@
               <a:rPr lang="en-US" dirty="0" smtClean="0"/>
               <a:t>Malicious</a:t>
             </a:r>
-            <a:endParaRPr lang="en-US" dirty="0" smtClean="0"/>
           </a:p>
           <a:p>
             <a:pPr algn="ctr"/>
@@ -3142,7 +3141,7 @@
         </p:nvGrpSpPr>
         <p:grpSpPr>
           <a:xfrm>
-            <a:off x="2589195" y="1486525"/>
+            <a:off x="3759210" y="1486525"/>
             <a:ext cx="830677" cy="934363"/>
             <a:chOff x="8160947" y="548680"/>
             <a:chExt cx="830677" cy="934363"/>
@@ -3174,7 +3173,6 @@
                 <a:rPr lang="en-US" dirty="0" smtClean="0"/>
                 <a:t>Benign</a:t>
               </a:r>
-              <a:endParaRPr lang="en-US" dirty="0" smtClean="0"/>
             </a:p>
             <a:p>
               <a:pPr algn="ctr"/>
@@ -3233,7 +3231,7 @@
         </p:nvSpPr>
         <p:spPr>
           <a:xfrm>
-            <a:off x="970820" y="37644"/>
+            <a:off x="2001066" y="37644"/>
             <a:ext cx="596638" cy="646331"/>
           </a:xfrm>
           <a:prstGeom prst="rect">
@@ -3265,8 +3263,8 @@
         </p:nvSpPr>
         <p:spPr>
           <a:xfrm>
-            <a:off x="814263" y="465639"/>
-            <a:ext cx="1021433" cy="646331"/>
+            <a:off x="1677850" y="465639"/>
+            <a:ext cx="1309974" cy="646331"/>
           </a:xfrm>
           <a:prstGeom prst="rect">
             <a:avLst/>
@@ -3279,15 +3277,17 @@
           </a:bodyPr>
           <a:lstStyle/>
           <a:p>
+            <a:pPr algn="ctr"/>
             <a:r>
               <a:rPr lang="en-US" b="1" dirty="0" smtClean="0"/>
               <a:t>Reverse</a:t>
             </a:r>
           </a:p>
           <a:p>
+            <a:pPr algn="ctr"/>
             <a:r>
               <a:rPr lang="en-US" b="1" dirty="0" smtClean="0"/>
-              <a:t>Engineer</a:t>
+              <a:t>Engineering</a:t>
             </a:r>
             <a:endParaRPr lang="pt-BR" b="1" dirty="0"/>
           </a:p>
@@ -3301,7 +3301,7 @@
         </p:nvCxnSpPr>
         <p:spPr>
           <a:xfrm>
-            <a:off x="1853850" y="764704"/>
+            <a:off x="2938742" y="764704"/>
             <a:ext cx="485902" cy="0"/>
           </a:xfrm>
           <a:prstGeom prst="straightConnector1">
@@ -3335,8 +3335,8 @@
         </p:nvSpPr>
         <p:spPr>
           <a:xfrm>
-            <a:off x="2495454" y="555556"/>
-            <a:ext cx="1068434" cy="369332"/>
+            <a:off x="3487633" y="555556"/>
+            <a:ext cx="1449179" cy="369332"/>
           </a:xfrm>
           <a:prstGeom prst="rect">
             <a:avLst/>
@@ -3351,7 +3351,7 @@
           <a:p>
             <a:r>
               <a:rPr lang="en-US" b="1" dirty="0" smtClean="0"/>
-              <a:t>Minimize</a:t>
+              <a:t>Minimization</a:t>
             </a:r>
             <a:endParaRPr lang="pt-BR" b="1" dirty="0"/>
           </a:p>
@@ -3365,10 +3365,10 @@
         </p:nvGrpSpPr>
         <p:grpSpPr>
           <a:xfrm>
-            <a:off x="4797552" y="1619508"/>
-            <a:ext cx="689612" cy="657364"/>
-            <a:chOff x="8253936" y="548680"/>
-            <a:chExt cx="689612" cy="657364"/>
+            <a:off x="5793928" y="1505724"/>
+            <a:ext cx="949940" cy="871647"/>
+            <a:chOff x="8150266" y="548680"/>
+            <a:chExt cx="949940" cy="871647"/>
           </a:xfrm>
         </p:grpSpPr>
         <p:sp>
@@ -3379,8 +3379,8 @@
           </p:nvSpPr>
           <p:spPr>
             <a:xfrm>
-              <a:off x="8253936" y="836712"/>
-              <a:ext cx="689612" cy="369332"/>
+              <a:off x="8150266" y="773996"/>
+              <a:ext cx="949940" cy="646331"/>
             </a:xfrm>
             <a:prstGeom prst="rect">
               <a:avLst/>
@@ -3393,6 +3393,14 @@
             </a:bodyPr>
             <a:lstStyle/>
             <a:p>
+              <a:pPr algn="ctr"/>
+              <a:r>
+                <a:rPr lang="en-US" dirty="0" smtClean="0"/>
+                <a:t>Existing </a:t>
+              </a:r>
+            </a:p>
+            <a:p>
+              <a:pPr algn="ctr"/>
               <a:r>
                 <a:rPr lang="en-US" dirty="0" smtClean="0"/>
                 <a:t>Rules</a:t>
@@ -3440,40 +3448,6 @@
           </p:txBody>
         </p:sp>
       </p:grpSp>
-      <p:cxnSp>
-        <p:nvCxnSpPr>
-          <p:cNvPr id="54" name="Conector de seta reta 53"/>
-          <p:cNvCxnSpPr/>
-          <p:nvPr/>
-        </p:nvCxnSpPr>
-        <p:spPr>
-          <a:xfrm>
-            <a:off x="3579872" y="764704"/>
-            <a:ext cx="1280160" cy="0"/>
-          </a:xfrm>
-          <a:prstGeom prst="straightConnector1">
-            <a:avLst/>
-          </a:prstGeom>
-          <a:ln>
-            <a:headEnd type="none" w="med" len="med"/>
-            <a:tailEnd type="triangle" w="med" len="med"/>
-          </a:ln>
-        </p:spPr>
-        <p:style>
-          <a:lnRef idx="1">
-            <a:schemeClr val="dk1"/>
-          </a:lnRef>
-          <a:fillRef idx="0">
-            <a:schemeClr val="dk1"/>
-          </a:fillRef>
-          <a:effectRef idx="0">
-            <a:schemeClr val="dk1"/>
-          </a:effectRef>
-          <a:fontRef idx="minor">
-            <a:schemeClr val="tx1"/>
-          </a:fontRef>
-        </p:style>
-      </p:cxnSp>
       <p:sp>
         <p:nvSpPr>
           <p:cNvPr id="73" name="CaixaDeTexto 72"/>
@@ -3482,8 +3456,8 @@
         </p:nvSpPr>
         <p:spPr>
           <a:xfrm>
-            <a:off x="4860032" y="548680"/>
-            <a:ext cx="662361" cy="369332"/>
+            <a:off x="5709331" y="548680"/>
+            <a:ext cx="950901" cy="369332"/>
           </a:xfrm>
           <a:prstGeom prst="rect">
             <a:avLst/>
@@ -3498,7 +3472,7 @@
           <a:p>
             <a:r>
               <a:rPr lang="en-US" b="1" dirty="0" smtClean="0"/>
-              <a:t>Rank</a:t>
+              <a:t>Ranking</a:t>
             </a:r>
             <a:endParaRPr lang="pt-BR" b="1" dirty="0"/>
           </a:p>
@@ -3512,7 +3486,7 @@
         </p:nvSpPr>
         <p:spPr>
           <a:xfrm>
-            <a:off x="2690904" y="46365"/>
+            <a:off x="3860919" y="46365"/>
             <a:ext cx="596638" cy="646331"/>
           </a:xfrm>
           <a:prstGeom prst="rect">
@@ -3545,7 +3519,7 @@
         </p:nvSpPr>
         <p:spPr>
           <a:xfrm>
-            <a:off x="4860032" y="44624"/>
+            <a:off x="5890278" y="44624"/>
             <a:ext cx="596638" cy="646331"/>
           </a:xfrm>
           <a:prstGeom prst="rect">
@@ -3578,7 +3552,7 @@
         </p:nvSpPr>
         <p:spPr>
           <a:xfrm>
-            <a:off x="395536" y="46365"/>
+            <a:off x="1425782" y="46365"/>
             <a:ext cx="5616624" cy="1218005"/>
           </a:xfrm>
           <a:prstGeom prst="rect">
@@ -3616,70 +3590,6 @@
           </a:p>
         </p:txBody>
       </p:sp>
-      <p:sp>
-        <p:nvSpPr>
-          <p:cNvPr id="36" name="CaixaDeTexto 35"/>
-          <p:cNvSpPr txBox="1"/>
-          <p:nvPr/>
-        </p:nvSpPr>
-        <p:spPr>
-          <a:xfrm>
-            <a:off x="-20940" y="1633468"/>
-            <a:ext cx="837089" cy="369332"/>
-          </a:xfrm>
-          <a:prstGeom prst="rect">
-            <a:avLst/>
-          </a:prstGeom>
-          <a:noFill/>
-        </p:spPr>
-        <p:txBody>
-          <a:bodyPr wrap="none" rtlCol="0">
-            <a:spAutoFit/>
-          </a:bodyPr>
-          <a:lstStyle/>
-          <a:p>
-            <a:r>
-              <a:rPr lang="en-US" dirty="0" smtClean="0"/>
-              <a:t>Inputs:</a:t>
-            </a:r>
-            <a:endParaRPr lang="en-US" dirty="0"/>
-          </a:p>
-        </p:txBody>
-      </p:sp>
-      <p:cxnSp>
-        <p:nvCxnSpPr>
-          <p:cNvPr id="50" name="Conector de seta reta 49"/>
-          <p:cNvCxnSpPr/>
-          <p:nvPr/>
-        </p:nvCxnSpPr>
-        <p:spPr>
-          <a:xfrm flipH="1" flipV="1">
-            <a:off x="1324649" y="1052736"/>
-            <a:ext cx="1" cy="548209"/>
-          </a:xfrm>
-          <a:prstGeom prst="straightConnector1">
-            <a:avLst/>
-          </a:prstGeom>
-          <a:ln>
-            <a:headEnd type="none" w="med" len="med"/>
-            <a:tailEnd type="triangle" w="med" len="med"/>
-          </a:ln>
-        </p:spPr>
-        <p:style>
-          <a:lnRef idx="1">
-            <a:schemeClr val="dk1"/>
-          </a:lnRef>
-          <a:fillRef idx="0">
-            <a:schemeClr val="dk1"/>
-          </a:fillRef>
-          <a:effectRef idx="0">
-            <a:schemeClr val="dk1"/>
-          </a:effectRef>
-          <a:fontRef idx="minor">
-            <a:schemeClr val="tx1"/>
-          </a:fontRef>
-        </p:style>
-      </p:cxnSp>
       <p:cxnSp>
         <p:nvCxnSpPr>
           <p:cNvPr id="76" name="Conector de seta reta 75"/>
@@ -3688,42 +3598,8 @@
         </p:nvCxnSpPr>
         <p:spPr>
           <a:xfrm flipV="1">
-            <a:off x="2988893" y="903244"/>
+            <a:off x="4158908" y="903244"/>
             <a:ext cx="330" cy="509532"/>
-          </a:xfrm>
-          <a:prstGeom prst="straightConnector1">
-            <a:avLst/>
-          </a:prstGeom>
-          <a:ln>
-            <a:headEnd type="none" w="med" len="med"/>
-            <a:tailEnd type="triangle" w="med" len="med"/>
-          </a:ln>
-        </p:spPr>
-        <p:style>
-          <a:lnRef idx="1">
-            <a:schemeClr val="dk1"/>
-          </a:lnRef>
-          <a:fillRef idx="0">
-            <a:schemeClr val="dk1"/>
-          </a:fillRef>
-          <a:effectRef idx="0">
-            <a:schemeClr val="dk1"/>
-          </a:effectRef>
-          <a:fontRef idx="minor">
-            <a:schemeClr val="tx1"/>
-          </a:fontRef>
-        </p:style>
-      </p:cxnSp>
-      <p:cxnSp>
-        <p:nvCxnSpPr>
-          <p:cNvPr id="77" name="Conector de seta reta 76"/>
-          <p:cNvCxnSpPr/>
-          <p:nvPr/>
-        </p:nvCxnSpPr>
-        <p:spPr>
-          <a:xfrm flipV="1">
-            <a:off x="5125253" y="908721"/>
-            <a:ext cx="0" cy="564376"/>
           </a:xfrm>
           <a:prstGeom prst="straightConnector1">
             <a:avLst/>
@@ -3756,7 +3632,7 @@
         </p:nvCxnSpPr>
         <p:spPr>
           <a:xfrm>
-            <a:off x="5580112" y="722090"/>
+            <a:off x="6610358" y="722090"/>
             <a:ext cx="648072" cy="0"/>
           </a:xfrm>
           <a:prstGeom prst="straightConnector1">
@@ -3790,7 +3666,7 @@
         </p:nvSpPr>
         <p:spPr>
           <a:xfrm>
-            <a:off x="6084168" y="404664"/>
+            <a:off x="7009714" y="404664"/>
             <a:ext cx="1922082" cy="646331"/>
           </a:xfrm>
           <a:prstGeom prst="rect">
@@ -3821,8 +3697,8 @@
         </p:nvSpPr>
         <p:spPr>
           <a:xfrm>
-            <a:off x="3203848" y="260648"/>
-            <a:ext cx="1922082" cy="369332"/>
+            <a:off x="4553447" y="123612"/>
+            <a:ext cx="1475237" cy="646331"/>
           </a:xfrm>
           <a:prstGeom prst="rect">
             <a:avLst/>
@@ -3852,8 +3728,8 @@
         </p:nvSpPr>
         <p:spPr>
           <a:xfrm>
-            <a:off x="1451999" y="111440"/>
-            <a:ext cx="1354701" cy="646331"/>
+            <a:off x="2488540" y="111440"/>
+            <a:ext cx="1435388" cy="646331"/>
           </a:xfrm>
           <a:prstGeom prst="rect">
             <a:avLst/>
@@ -3869,16 +3745,122 @@
             <a:pPr algn="ctr"/>
             <a:r>
               <a:rPr lang="en-US" dirty="0" err="1" smtClean="0"/>
-              <a:t>overspecific</a:t>
+              <a:t>overspecified</a:t>
             </a:r>
             <a:r>
               <a:rPr lang="en-US" dirty="0" smtClean="0"/>
-              <a:t> rule</a:t>
+              <a:t> </a:t>
+            </a:r>
+            <a:r>
+              <a:rPr lang="en-US" dirty="0" smtClean="0"/>
+              <a:t>rule</a:t>
             </a:r>
             <a:endParaRPr lang="pt-BR" dirty="0"/>
           </a:p>
         </p:txBody>
       </p:sp>
+      <p:cxnSp>
+        <p:nvCxnSpPr>
+          <p:cNvPr id="26" name="Conector de seta reta 25"/>
+          <p:cNvCxnSpPr/>
+          <p:nvPr/>
+        </p:nvCxnSpPr>
+        <p:spPr>
+          <a:xfrm>
+            <a:off x="1115616" y="715844"/>
+            <a:ext cx="648072" cy="0"/>
+          </a:xfrm>
+          <a:prstGeom prst="straightConnector1">
+            <a:avLst/>
+          </a:prstGeom>
+          <a:ln>
+            <a:headEnd type="none" w="med" len="med"/>
+            <a:tailEnd type="triangle" w="med" len="med"/>
+          </a:ln>
+        </p:spPr>
+        <p:style>
+          <a:lnRef idx="1">
+            <a:schemeClr val="dk1"/>
+          </a:lnRef>
+          <a:fillRef idx="0">
+            <a:schemeClr val="dk1"/>
+          </a:fillRef>
+          <a:effectRef idx="0">
+            <a:schemeClr val="dk1"/>
+          </a:effectRef>
+          <a:fontRef idx="minor">
+            <a:schemeClr val="tx1"/>
+          </a:fontRef>
+        </p:style>
+      </p:cxnSp>
+      <p:cxnSp>
+        <p:nvCxnSpPr>
+          <p:cNvPr id="27" name="Conector de seta reta 26"/>
+          <p:cNvCxnSpPr/>
+          <p:nvPr/>
+        </p:nvCxnSpPr>
+        <p:spPr>
+          <a:xfrm flipV="1">
+            <a:off x="6227854" y="903244"/>
+            <a:ext cx="330" cy="509532"/>
+          </a:xfrm>
+          <a:prstGeom prst="straightConnector1">
+            <a:avLst/>
+          </a:prstGeom>
+          <a:ln>
+            <a:headEnd type="none" w="med" len="med"/>
+            <a:tailEnd type="triangle" w="med" len="med"/>
+          </a:ln>
+        </p:spPr>
+        <p:style>
+          <a:lnRef idx="1">
+            <a:schemeClr val="dk1"/>
+          </a:lnRef>
+          <a:fillRef idx="0">
+            <a:schemeClr val="dk1"/>
+          </a:fillRef>
+          <a:effectRef idx="0">
+            <a:schemeClr val="dk1"/>
+          </a:effectRef>
+          <a:fontRef idx="minor">
+            <a:schemeClr val="tx1"/>
+          </a:fontRef>
+        </p:style>
+      </p:cxnSp>
+      <p:cxnSp>
+        <p:nvCxnSpPr>
+          <p:cNvPr id="34" name="Conector de seta reta 33"/>
+          <p:cNvCxnSpPr/>
+          <p:nvPr/>
+        </p:nvCxnSpPr>
+        <p:spPr>
+          <a:xfrm>
+            <a:off x="5020572" y="727596"/>
+            <a:ext cx="648072" cy="0"/>
+          </a:xfrm>
+          <a:prstGeom prst="straightConnector1">
+            <a:avLst/>
+          </a:prstGeom>
+          <a:ln>
+            <a:headEnd type="none" w="med" len="med"/>
+            <a:tailEnd type="triangle" w="med" len="med"/>
+          </a:ln>
+        </p:spPr>
+        <p:style>
+          <a:lnRef idx="1">
+            <a:schemeClr val="dk1"/>
+          </a:lnRef>
+          <a:fillRef idx="0">
+            <a:schemeClr val="dk1"/>
+          </a:fillRef>
+          <a:effectRef idx="0">
+            <a:schemeClr val="dk1"/>
+          </a:effectRef>
+          <a:fontRef idx="minor">
+            <a:schemeClr val="tx1"/>
+          </a:fontRef>
+        </p:style>
+      </p:cxnSp>
     </p:spTree>
     <p:extLst>
       <p:ext uri="{BB962C8B-B14F-4D97-AF65-F5344CB8AC3E}">

</xml_diff>